<commit_message>
deleted Internal saving function and put filelist view into fragment
</commit_message>
<xml_diff>
--- a/FinalPresentation.pptx
+++ b/FinalPresentation.pptx
@@ -5,15 +5,16 @@
     <p:sldMasterId id="2147483649" r:id="rId1"/>
   </p:sldMasterIdLst>
   <p:notesMasterIdLst>
-    <p:notesMasterId r:id="rId5"/>
+    <p:notesMasterId r:id="rId6"/>
   </p:notesMasterIdLst>
   <p:handoutMasterIdLst>
-    <p:handoutMasterId r:id="rId6"/>
+    <p:handoutMasterId r:id="rId7"/>
   </p:handoutMasterIdLst>
   <p:sldIdLst>
     <p:sldId id="259" r:id="rId2"/>
-    <p:sldId id="305" r:id="rId3"/>
-    <p:sldId id="287" r:id="rId4"/>
+    <p:sldId id="306" r:id="rId3"/>
+    <p:sldId id="305" r:id="rId4"/>
+    <p:sldId id="287" r:id="rId5"/>
   </p:sldIdLst>
   <p:sldSz cx="9144000" cy="6858000" type="screen4x3"/>
   <p:notesSz cx="6858000" cy="9144000"/>
@@ -3298,21 +3299,8 @@
                   <a:schemeClr val="tx1"/>
                 </a:solidFill>
               </a:rPr>
-              <a:t>29</a:t>
-            </a:r>
-            <a:r>
-              <a:rPr lang="de-DE" sz="1800" dirty="0" smtClean="0">
-                <a:solidFill>
-                  <a:schemeClr val="tx1"/>
-                </a:solidFill>
-              </a:rPr>
-              <a:t>.01.2016</a:t>
-            </a:r>
-            <a:endParaRPr lang="de-DE" sz="1800" dirty="0" smtClean="0">
-              <a:solidFill>
-                <a:schemeClr val="tx1"/>
-              </a:solidFill>
-            </a:endParaRPr>
+              <a:t>29.01.2016</a:t>
+            </a:r>
           </a:p>
         </p:txBody>
       </p:sp>
@@ -3369,6 +3357,660 @@
           <a:lstStyle/>
           <a:p>
             <a:r>
+              <a:rPr lang="de-DE" dirty="0" smtClean="0"/>
+              <a:t>Global </a:t>
+            </a:r>
+            <a:r>
+              <a:rPr lang="de-DE" dirty="0" err="1" smtClean="0"/>
+              <a:t>Structure</a:t>
+            </a:r>
+            <a:endParaRPr lang="de-DE" dirty="0"/>
+          </a:p>
+        </p:txBody>
+      </p:sp>
+      <p:sp>
+        <p:nvSpPr>
+          <p:cNvPr id="4" name="Datumsplatzhalter 3"/>
+          <p:cNvSpPr>
+            <a:spLocks noGrp="1"/>
+          </p:cNvSpPr>
+          <p:nvPr>
+            <p:ph type="dt" sz="half" idx="2"/>
+          </p:nvPr>
+        </p:nvSpPr>
+        <p:spPr/>
+        <p:txBody>
+          <a:bodyPr/>
+          <a:lstStyle/>
+          <a:p>
+            <a:r>
+              <a:rPr lang="de-CH" smtClean="0"/>
+              <a:t>29.01.2016</a:t>
+            </a:r>
+            <a:endParaRPr lang="en-US" dirty="0"/>
+          </a:p>
+        </p:txBody>
+      </p:sp>
+      <p:sp>
+        <p:nvSpPr>
+          <p:cNvPr id="5" name="Fußzeilenplatzhalter 4"/>
+          <p:cNvSpPr>
+            <a:spLocks noGrp="1"/>
+          </p:cNvSpPr>
+          <p:nvPr>
+            <p:ph type="ftr" sz="quarter" idx="3"/>
+          </p:nvPr>
+        </p:nvSpPr>
+        <p:spPr/>
+        <p:txBody>
+          <a:bodyPr/>
+          <a:lstStyle/>
+          <a:p>
+            <a:r>
+              <a:rPr lang="en-US" smtClean="0"/>
+              <a:t>Katie Jones</a:t>
+            </a:r>
+            <a:br>
+              <a:rPr lang="en-US" smtClean="0"/>
+            </a:br>
+            <a:r>
+              <a:rPr lang="en-US" smtClean="0"/>
+              <a:t>Frederike Dümbgen</a:t>
+            </a:r>
+            <a:endParaRPr lang="en-US" dirty="0"/>
+          </a:p>
+        </p:txBody>
+      </p:sp>
+      <p:sp>
+        <p:nvSpPr>
+          <p:cNvPr id="6" name="Foliennummernplatzhalter 5"/>
+          <p:cNvSpPr>
+            <a:spLocks noGrp="1"/>
+          </p:cNvSpPr>
+          <p:nvPr>
+            <p:ph type="sldNum" sz="quarter" idx="4"/>
+          </p:nvPr>
+        </p:nvSpPr>
+        <p:spPr/>
+        <p:txBody>
+          <a:bodyPr/>
+          <a:lstStyle/>
+          <a:p>
+            <a:fld id="{650B5BBF-7EA4-AE40-9211-F5CA64DA190C}" type="slidenum">
+              <a:rPr lang="en-US" smtClean="0"/>
+              <a:pPr/>
+              <a:t>2</a:t>
+            </a:fld>
+            <a:endParaRPr lang="en-US"/>
+          </a:p>
+        </p:txBody>
+      </p:sp>
+      <p:sp>
+        <p:nvSpPr>
+          <p:cNvPr id="7" name="Rechteck 6"/>
+          <p:cNvSpPr/>
+          <p:nvPr/>
+        </p:nvSpPr>
+        <p:spPr bwMode="auto">
+          <a:xfrm>
+            <a:off x="2743200" y="1676400"/>
+            <a:ext cx="2514600" cy="3352800"/>
+          </a:xfrm>
+          <a:prstGeom prst="rect">
+            <a:avLst/>
+          </a:prstGeom>
+          <a:solidFill>
+            <a:schemeClr val="accent1"/>
+          </a:solidFill>
+          <a:ln w="12700" cap="sq" cmpd="sng" algn="ctr">
+            <a:solidFill>
+              <a:schemeClr val="tx1"/>
+            </a:solidFill>
+            <a:prstDash val="solid"/>
+            <a:round/>
+            <a:headEnd type="none" w="sm" len="sm"/>
+            <a:tailEnd type="none" w="sm" len="sm"/>
+          </a:ln>
+          <a:effectLst/>
+          <a:extLst>
+            <a:ext uri="{AF507438-7753-43e0-B8FC-AC1667EBCBE1}">
+              <a14:hiddenEffects xmlns:a14="http://schemas.microsoft.com/office/drawing/2010/main">
+                <a:effectLst>
+                  <a:outerShdw blurRad="63500" dist="38099" dir="2700000" algn="ctr" rotWithShape="0">
+                    <a:schemeClr val="bg2">
+                      <a:alpha val="74998"/>
+                    </a:schemeClr>
+                  </a:outerShdw>
+                </a:effectLst>
+              </a14:hiddenEffects>
+            </a:ext>
+          </a:extLst>
+        </p:spPr>
+        <p:txBody>
+          <a:bodyPr vert="horz" wrap="square" lIns="91440" tIns="45720" rIns="91440" bIns="45720" numCol="1" rtlCol="0" anchor="t" anchorCtr="0" compatLnSpc="1">
+            <a:prstTxWarp prst="textNoShape">
+              <a:avLst/>
+            </a:prstTxWarp>
+          </a:bodyPr>
+          <a:lstStyle/>
+          <a:p>
+            <a:pPr marL="0" marR="0" indent="0" algn="ctr" defTabSz="914400" rtl="0" eaLnBrk="0" fontAlgn="base" latinLnBrk="0" hangingPunct="0">
+              <a:lnSpc>
+                <a:spcPct val="100000"/>
+              </a:lnSpc>
+              <a:spcBef>
+                <a:spcPct val="0"/>
+              </a:spcBef>
+              <a:spcAft>
+                <a:spcPct val="0"/>
+              </a:spcAft>
+              <a:buClrTx/>
+              <a:buSzTx/>
+              <a:buFontTx/>
+              <a:buNone/>
+              <a:tabLst/>
+            </a:pPr>
+            <a:r>
+              <a:rPr kumimoji="0" lang="de-DE" sz="2400" b="0" i="0" u="none" strike="noStrike" cap="none" normalizeH="0" baseline="0" dirty="0" err="1" smtClean="0">
+                <a:ln>
+                  <a:noFill/>
+                </a:ln>
+                <a:solidFill>
+                  <a:schemeClr val="tx1"/>
+                </a:solidFill>
+                <a:effectLst/>
+                <a:latin typeface="Cambria"/>
+                <a:ea typeface="ＭＳ Ｐゴシック" charset="0"/>
+                <a:cs typeface="Cambria"/>
+              </a:rPr>
+              <a:t>MainActivity</a:t>
+            </a:r>
+            <a:endParaRPr kumimoji="0" lang="de-DE" sz="2400" b="0" i="0" u="none" strike="noStrike" cap="none" normalizeH="0" baseline="0" dirty="0">
+              <a:ln>
+                <a:noFill/>
+              </a:ln>
+              <a:solidFill>
+                <a:schemeClr val="tx1"/>
+              </a:solidFill>
+              <a:effectLst/>
+              <a:latin typeface="Cambria"/>
+              <a:ea typeface="ＭＳ Ｐゴシック" charset="0"/>
+              <a:cs typeface="Cambria"/>
+            </a:endParaRPr>
+          </a:p>
+        </p:txBody>
+      </p:sp>
+      <p:sp>
+        <p:nvSpPr>
+          <p:cNvPr id="9" name="Rechteck 8"/>
+          <p:cNvSpPr/>
+          <p:nvPr/>
+        </p:nvSpPr>
+        <p:spPr bwMode="auto">
+          <a:xfrm>
+            <a:off x="2895600" y="2514600"/>
+            <a:ext cx="2209800" cy="2362200"/>
+          </a:xfrm>
+          <a:prstGeom prst="rect">
+            <a:avLst/>
+          </a:prstGeom>
+          <a:solidFill>
+            <a:schemeClr val="accent1"/>
+          </a:solidFill>
+          <a:ln w="12700" cap="sq" cmpd="sng" algn="ctr">
+            <a:solidFill>
+              <a:schemeClr val="tx1"/>
+            </a:solidFill>
+            <a:prstDash val="solid"/>
+            <a:round/>
+            <a:headEnd type="none" w="sm" len="sm"/>
+            <a:tailEnd type="none" w="sm" len="sm"/>
+          </a:ln>
+          <a:effectLst/>
+          <a:extLst>
+            <a:ext uri="{AF507438-7753-43e0-B8FC-AC1667EBCBE1}">
+              <a14:hiddenEffects xmlns:a14="http://schemas.microsoft.com/office/drawing/2010/main">
+                <a:effectLst>
+                  <a:outerShdw blurRad="63500" dist="38099" dir="2700000" algn="ctr" rotWithShape="0">
+                    <a:schemeClr val="bg2">
+                      <a:alpha val="74998"/>
+                    </a:schemeClr>
+                  </a:outerShdw>
+                </a:effectLst>
+              </a14:hiddenEffects>
+            </a:ext>
+          </a:extLst>
+        </p:spPr>
+        <p:txBody>
+          <a:bodyPr vert="horz" wrap="square" lIns="91440" tIns="45720" rIns="91440" bIns="45720" numCol="1" rtlCol="0" anchor="t" anchorCtr="0" compatLnSpc="1">
+            <a:prstTxWarp prst="textNoShape">
+              <a:avLst/>
+            </a:prstTxWarp>
+          </a:bodyPr>
+          <a:lstStyle/>
+          <a:p>
+            <a:pPr marL="0" marR="0" indent="0" algn="ctr" defTabSz="914400" rtl="0" eaLnBrk="0" fontAlgn="base" latinLnBrk="0" hangingPunct="0">
+              <a:lnSpc>
+                <a:spcPct val="100000"/>
+              </a:lnSpc>
+              <a:spcBef>
+                <a:spcPct val="0"/>
+              </a:spcBef>
+              <a:spcAft>
+                <a:spcPct val="0"/>
+              </a:spcAft>
+              <a:buClrTx/>
+              <a:buSzTx/>
+              <a:buFontTx/>
+              <a:buNone/>
+              <a:tabLst/>
+            </a:pPr>
+            <a:r>
+              <a:rPr kumimoji="0" lang="de-DE" sz="2400" b="0" i="0" u="none" strike="noStrike" cap="none" normalizeH="0" baseline="0" dirty="0" err="1" smtClean="0">
+                <a:ln>
+                  <a:noFill/>
+                </a:ln>
+                <a:solidFill>
+                  <a:schemeClr val="tx1"/>
+                </a:solidFill>
+                <a:effectLst/>
+                <a:latin typeface="Cambria"/>
+                <a:ea typeface="ＭＳ Ｐゴシック" charset="0"/>
+                <a:cs typeface="Cambria"/>
+              </a:rPr>
+              <a:t>MainFragment</a:t>
+            </a:r>
+            <a:endParaRPr kumimoji="0" lang="de-DE" sz="2400" b="0" i="0" u="none" strike="noStrike" cap="none" normalizeH="0" baseline="0" dirty="0">
+              <a:ln>
+                <a:noFill/>
+              </a:ln>
+              <a:solidFill>
+                <a:schemeClr val="tx1"/>
+              </a:solidFill>
+              <a:effectLst/>
+              <a:latin typeface="Cambria"/>
+              <a:ea typeface="ＭＳ Ｐゴシック" charset="0"/>
+              <a:cs typeface="Cambria"/>
+            </a:endParaRPr>
+          </a:p>
+        </p:txBody>
+      </p:sp>
+      <p:sp>
+        <p:nvSpPr>
+          <p:cNvPr id="10" name="Rechteck 9"/>
+          <p:cNvSpPr/>
+          <p:nvPr/>
+        </p:nvSpPr>
+        <p:spPr bwMode="auto">
+          <a:xfrm>
+            <a:off x="5562600" y="1981200"/>
+            <a:ext cx="1524000" cy="1600200"/>
+          </a:xfrm>
+          <a:prstGeom prst="rect">
+            <a:avLst/>
+          </a:prstGeom>
+          <a:solidFill>
+            <a:schemeClr val="accent1">
+              <a:lumMod val="40000"/>
+              <a:lumOff val="60000"/>
+            </a:schemeClr>
+          </a:solidFill>
+          <a:ln w="12700" cap="sq" cmpd="sng" algn="ctr">
+            <a:solidFill>
+              <a:schemeClr val="tx1"/>
+            </a:solidFill>
+            <a:prstDash val="solid"/>
+            <a:round/>
+            <a:headEnd type="none" w="sm" len="sm"/>
+            <a:tailEnd type="none" w="sm" len="sm"/>
+          </a:ln>
+          <a:effectLst/>
+          <a:extLst/>
+        </p:spPr>
+        <p:txBody>
+          <a:bodyPr vert="horz" wrap="square" lIns="91440" tIns="45720" rIns="91440" bIns="45720" numCol="1" rtlCol="0" anchor="t" anchorCtr="0" compatLnSpc="1">
+            <a:prstTxWarp prst="textNoShape">
+              <a:avLst/>
+            </a:prstTxWarp>
+          </a:bodyPr>
+          <a:lstStyle/>
+          <a:p>
+            <a:pPr marL="0" marR="0" indent="0" algn="ctr" defTabSz="914400" rtl="0" eaLnBrk="0" fontAlgn="base" latinLnBrk="0" hangingPunct="0">
+              <a:lnSpc>
+                <a:spcPct val="100000"/>
+              </a:lnSpc>
+              <a:spcBef>
+                <a:spcPct val="0"/>
+              </a:spcBef>
+              <a:spcAft>
+                <a:spcPct val="0"/>
+              </a:spcAft>
+              <a:buClrTx/>
+              <a:buSzTx/>
+              <a:buFontTx/>
+              <a:buNone/>
+              <a:tabLst/>
+            </a:pPr>
+            <a:r>
+              <a:rPr kumimoji="0" lang="de-DE" sz="1600" b="0" i="0" u="none" strike="noStrike" cap="none" normalizeH="0" baseline="0" dirty="0" err="1" smtClean="0">
+                <a:ln>
+                  <a:noFill/>
+                </a:ln>
+                <a:solidFill>
+                  <a:schemeClr val="tx1"/>
+                </a:solidFill>
+                <a:effectLst/>
+                <a:latin typeface="Cambria"/>
+                <a:ea typeface="ＭＳ Ｐゴシック" charset="0"/>
+                <a:cs typeface="Cambria"/>
+              </a:rPr>
+              <a:t>LiveFragment</a:t>
+            </a:r>
+            <a:endParaRPr kumimoji="0" lang="de-DE" sz="1600" b="0" i="0" u="none" strike="noStrike" cap="none" normalizeH="0" baseline="0" dirty="0">
+              <a:ln>
+                <a:noFill/>
+              </a:ln>
+              <a:solidFill>
+                <a:schemeClr val="tx1"/>
+              </a:solidFill>
+              <a:effectLst/>
+              <a:latin typeface="Cambria"/>
+              <a:ea typeface="ＭＳ Ｐゴシック" charset="0"/>
+              <a:cs typeface="Cambria"/>
+            </a:endParaRPr>
+          </a:p>
+        </p:txBody>
+      </p:sp>
+      <p:sp>
+        <p:nvSpPr>
+          <p:cNvPr id="11" name="Rechteck 10"/>
+          <p:cNvSpPr/>
+          <p:nvPr/>
+        </p:nvSpPr>
+        <p:spPr bwMode="auto">
+          <a:xfrm>
+            <a:off x="5562600" y="3733800"/>
+            <a:ext cx="1524000" cy="1600200"/>
+          </a:xfrm>
+          <a:prstGeom prst="rect">
+            <a:avLst/>
+          </a:prstGeom>
+          <a:solidFill>
+            <a:srgbClr val="ADC2FF"/>
+          </a:solidFill>
+          <a:ln w="12700" cap="sq" cmpd="sng" algn="ctr">
+            <a:solidFill>
+              <a:schemeClr val="tx1"/>
+            </a:solidFill>
+            <a:prstDash val="solid"/>
+            <a:round/>
+            <a:headEnd type="none" w="sm" len="sm"/>
+            <a:tailEnd type="none" w="sm" len="sm"/>
+          </a:ln>
+          <a:effectLst/>
+          <a:extLst/>
+        </p:spPr>
+        <p:txBody>
+          <a:bodyPr vert="horz" wrap="square" lIns="91440" tIns="45720" rIns="91440" bIns="45720" numCol="1" rtlCol="0" anchor="t" anchorCtr="0" compatLnSpc="1">
+            <a:prstTxWarp prst="textNoShape">
+              <a:avLst/>
+            </a:prstTxWarp>
+          </a:bodyPr>
+          <a:lstStyle/>
+          <a:p>
+            <a:pPr marL="0" marR="0" indent="0" algn="ctr" defTabSz="914400" rtl="0" eaLnBrk="0" fontAlgn="base" latinLnBrk="0" hangingPunct="0">
+              <a:lnSpc>
+                <a:spcPct val="100000"/>
+              </a:lnSpc>
+              <a:spcBef>
+                <a:spcPct val="0"/>
+              </a:spcBef>
+              <a:spcAft>
+                <a:spcPct val="0"/>
+              </a:spcAft>
+              <a:buClrTx/>
+              <a:buSzTx/>
+              <a:buFontTx/>
+              <a:buNone/>
+              <a:tabLst/>
+            </a:pPr>
+            <a:r>
+              <a:rPr kumimoji="0" lang="de-DE" sz="1600" b="0" i="0" u="none" strike="noStrike" cap="none" normalizeH="0" baseline="0" dirty="0" err="1" smtClean="0">
+                <a:ln>
+                  <a:noFill/>
+                </a:ln>
+                <a:solidFill>
+                  <a:schemeClr val="tx1"/>
+                </a:solidFill>
+                <a:effectLst/>
+                <a:latin typeface="Cambria"/>
+                <a:ea typeface="ＭＳ Ｐゴシック" charset="0"/>
+                <a:cs typeface="Cambria"/>
+              </a:rPr>
+              <a:t>StillFragment</a:t>
+            </a:r>
+            <a:endParaRPr kumimoji="0" lang="de-DE" sz="1600" b="0" i="0" u="none" strike="noStrike" cap="none" normalizeH="0" baseline="0" dirty="0">
+              <a:ln>
+                <a:noFill/>
+              </a:ln>
+              <a:solidFill>
+                <a:schemeClr val="tx1"/>
+              </a:solidFill>
+              <a:effectLst/>
+              <a:latin typeface="Cambria"/>
+              <a:ea typeface="ＭＳ Ｐゴシック" charset="0"/>
+              <a:cs typeface="Cambria"/>
+            </a:endParaRPr>
+          </a:p>
+        </p:txBody>
+      </p:sp>
+      <p:sp>
+        <p:nvSpPr>
+          <p:cNvPr id="12" name="Rechteck 11"/>
+          <p:cNvSpPr/>
+          <p:nvPr/>
+        </p:nvSpPr>
+        <p:spPr bwMode="auto">
+          <a:xfrm>
+            <a:off x="3276600" y="3048000"/>
+            <a:ext cx="1524000" cy="1600200"/>
+          </a:xfrm>
+          <a:prstGeom prst="rect">
+            <a:avLst/>
+          </a:prstGeom>
+          <a:solidFill>
+            <a:schemeClr val="accent1">
+              <a:lumMod val="40000"/>
+              <a:lumOff val="60000"/>
+            </a:schemeClr>
+          </a:solidFill>
+          <a:ln w="12700" cap="sq" cmpd="sng" algn="ctr">
+            <a:solidFill>
+              <a:schemeClr val="tx1"/>
+            </a:solidFill>
+            <a:prstDash val="solid"/>
+            <a:round/>
+            <a:headEnd type="none" w="sm" len="sm"/>
+            <a:tailEnd type="none" w="sm" len="sm"/>
+          </a:ln>
+          <a:effectLst/>
+          <a:extLst/>
+        </p:spPr>
+        <p:txBody>
+          <a:bodyPr vert="horz" wrap="square" lIns="91440" tIns="45720" rIns="91440" bIns="45720" numCol="1" rtlCol="0" anchor="t" anchorCtr="0" compatLnSpc="1">
+            <a:prstTxWarp prst="textNoShape">
+              <a:avLst/>
+            </a:prstTxWarp>
+          </a:bodyPr>
+          <a:lstStyle/>
+          <a:p>
+            <a:pPr marL="0" marR="0" indent="0" algn="ctr" defTabSz="914400" rtl="0" eaLnBrk="0" fontAlgn="base" latinLnBrk="0" hangingPunct="0">
+              <a:lnSpc>
+                <a:spcPct val="100000"/>
+              </a:lnSpc>
+              <a:spcBef>
+                <a:spcPct val="0"/>
+              </a:spcBef>
+              <a:spcAft>
+                <a:spcPct val="0"/>
+              </a:spcAft>
+              <a:buClrTx/>
+              <a:buSzTx/>
+              <a:buFontTx/>
+              <a:buNone/>
+              <a:tabLst/>
+            </a:pPr>
+            <a:endParaRPr kumimoji="0" lang="de-DE" sz="1600" b="0" i="0" u="none" strike="noStrike" cap="none" normalizeH="0" baseline="0" dirty="0">
+              <a:ln>
+                <a:noFill/>
+              </a:ln>
+              <a:solidFill>
+                <a:schemeClr val="tx1"/>
+              </a:solidFill>
+              <a:effectLst/>
+              <a:latin typeface="Cambria"/>
+              <a:ea typeface="ＭＳ Ｐゴシック" charset="0"/>
+              <a:cs typeface="Cambria"/>
+            </a:endParaRPr>
+          </a:p>
+        </p:txBody>
+      </p:sp>
+      <p:cxnSp>
+        <p:nvCxnSpPr>
+          <p:cNvPr id="14" name="Gerade Verbindung mit Pfeil 13"/>
+          <p:cNvCxnSpPr>
+            <a:stCxn id="12" idx="3"/>
+            <a:endCxn id="10" idx="1"/>
+          </p:cNvCxnSpPr>
+          <p:nvPr/>
+        </p:nvCxnSpPr>
+        <p:spPr bwMode="auto">
+          <a:xfrm flipV="1">
+            <a:off x="4800600" y="2781300"/>
+            <a:ext cx="762000" cy="1066800"/>
+          </a:xfrm>
+          <a:prstGeom prst="straightConnector1">
+            <a:avLst/>
+          </a:prstGeom>
+          <a:solidFill>
+            <a:schemeClr val="accent1"/>
+          </a:solidFill>
+          <a:ln w="12700" cap="sq" cmpd="sng" algn="ctr">
+            <a:solidFill>
+              <a:schemeClr val="tx1"/>
+            </a:solidFill>
+            <a:prstDash val="solid"/>
+            <a:round/>
+            <a:headEnd type="none" w="sm" len="sm"/>
+            <a:tailEnd type="arrow"/>
+          </a:ln>
+          <a:effectLst/>
+          <a:extLst>
+            <a:ext uri="{AF507438-7753-43e0-B8FC-AC1667EBCBE1}">
+              <a14:hiddenEffects xmlns:a14="http://schemas.microsoft.com/office/drawing/2010/main">
+                <a:effectLst>
+                  <a:outerShdw blurRad="63500" dist="38099" dir="2700000" algn="ctr" rotWithShape="0">
+                    <a:schemeClr val="bg2">
+                      <a:alpha val="74998"/>
+                    </a:schemeClr>
+                  </a:outerShdw>
+                </a:effectLst>
+              </a14:hiddenEffects>
+            </a:ext>
+          </a:extLst>
+        </p:spPr>
+      </p:cxnSp>
+      <p:cxnSp>
+        <p:nvCxnSpPr>
+          <p:cNvPr id="15" name="Gerade Verbindung mit Pfeil 14"/>
+          <p:cNvCxnSpPr>
+            <a:stCxn id="12" idx="3"/>
+            <a:endCxn id="11" idx="1"/>
+          </p:cNvCxnSpPr>
+          <p:nvPr/>
+        </p:nvCxnSpPr>
+        <p:spPr bwMode="auto">
+          <a:xfrm>
+            <a:off x="4800600" y="3848100"/>
+            <a:ext cx="762000" cy="685800"/>
+          </a:xfrm>
+          <a:prstGeom prst="straightConnector1">
+            <a:avLst/>
+          </a:prstGeom>
+          <a:solidFill>
+            <a:schemeClr val="accent1"/>
+          </a:solidFill>
+          <a:ln w="12700" cap="sq" cmpd="sng" algn="ctr">
+            <a:solidFill>
+              <a:schemeClr val="tx1"/>
+            </a:solidFill>
+            <a:prstDash val="solid"/>
+            <a:round/>
+            <a:headEnd type="none" w="sm" len="sm"/>
+            <a:tailEnd type="arrow"/>
+          </a:ln>
+          <a:effectLst/>
+          <a:extLst>
+            <a:ext uri="{AF507438-7753-43e0-B8FC-AC1667EBCBE1}">
+              <a14:hiddenEffects xmlns:a14="http://schemas.microsoft.com/office/drawing/2010/main">
+                <a:effectLst>
+                  <a:outerShdw blurRad="63500" dist="38099" dir="2700000" algn="ctr" rotWithShape="0">
+                    <a:schemeClr val="bg2">
+                      <a:alpha val="74998"/>
+                    </a:schemeClr>
+                  </a:outerShdw>
+                </a:effectLst>
+              </a14:hiddenEffects>
+            </a:ext>
+          </a:extLst>
+        </p:spPr>
+      </p:cxnSp>
+    </p:spTree>
+    <p:extLst>
+      <p:ext uri="{BB962C8B-B14F-4D97-AF65-F5344CB8AC3E}">
+        <p14:creationId xmlns:p14="http://schemas.microsoft.com/office/powerpoint/2010/main" val="291277637"/>
+      </p:ext>
+    </p:extLst>
+  </p:cSld>
+  <p:clrMapOvr>
+    <a:masterClrMapping/>
+  </p:clrMapOvr>
+</p:sld>
+</file>
+
+<file path=ppt/slides/slide3.xml><?xml version="1.0" encoding="utf-8"?>
+<p:sld xmlns:a="http://schemas.openxmlformats.org/drawingml/2006/main" xmlns:r="http://schemas.openxmlformats.org/officeDocument/2006/relationships" xmlns:p="http://schemas.openxmlformats.org/presentationml/2006/main">
+  <p:cSld>
+    <p:spTree>
+      <p:nvGrpSpPr>
+        <p:cNvPr id="1" name=""/>
+        <p:cNvGrpSpPr/>
+        <p:nvPr/>
+      </p:nvGrpSpPr>
+      <p:grpSpPr>
+        <a:xfrm>
+          <a:off x="0" y="0"/>
+          <a:ext cx="0" cy="0"/>
+          <a:chOff x="0" y="0"/>
+          <a:chExt cx="0" cy="0"/>
+        </a:xfrm>
+      </p:grpSpPr>
+      <p:sp>
+        <p:nvSpPr>
+          <p:cNvPr id="2" name="Titel 1"/>
+          <p:cNvSpPr>
+            <a:spLocks noGrp="1"/>
+          </p:cNvSpPr>
+          <p:nvPr>
+            <p:ph type="title"/>
+          </p:nvPr>
+        </p:nvSpPr>
+        <p:spPr/>
+        <p:txBody>
+          <a:bodyPr/>
+          <a:lstStyle/>
+          <a:p>
+            <a:r>
               <a:rPr lang="de-DE" dirty="0" err="1"/>
               <a:t>Conclusion</a:t>
             </a:r>
@@ -3600,7 +4242,7 @@
             <a:fld id="{650B5BBF-7EA4-AE40-9211-F5CA64DA190C}" type="slidenum">
               <a:rPr lang="en-US" smtClean="0"/>
               <a:pPr/>
-              <a:t>2</a:t>
+              <a:t>3</a:t>
             </a:fld>
             <a:endParaRPr lang="en-US"/>
           </a:p>
@@ -3619,7 +4261,7 @@
 </p:sld>
 </file>
 
-<file path=ppt/slides/slide3.xml><?xml version="1.0" encoding="utf-8"?>
+<file path=ppt/slides/slide4.xml><?xml version="1.0" encoding="utf-8"?>
 <p:sld xmlns:a="http://schemas.openxmlformats.org/drawingml/2006/main" xmlns:r="http://schemas.openxmlformats.org/officeDocument/2006/relationships" xmlns:p="http://schemas.openxmlformats.org/presentationml/2006/main">
   <p:cSld>
     <p:spTree>

</xml_diff>